<commit_message>
update twitter name in cover
</commit_message>
<xml_diff>
--- a/images/cover.pptx
+++ b/images/cover.pptx
@@ -243,7 +243,7 @@
           <a:p>
             <a:fld id="{3A6E2EEE-5BD3-164B-A81F-37A9AF828EF7}" type="datetimeFigureOut">
               <a:rPr lang="en-US" smtClean="0"/>
-              <a:t>9/13/20</a:t>
+              <a:t>11/8/20</a:t>
             </a:fld>
             <a:endParaRPr lang="en-US"/>
           </a:p>
@@ -413,7 +413,7 @@
           <a:p>
             <a:fld id="{3A6E2EEE-5BD3-164B-A81F-37A9AF828EF7}" type="datetimeFigureOut">
               <a:rPr lang="en-US" smtClean="0"/>
-              <a:t>9/13/20</a:t>
+              <a:t>11/8/20</a:t>
             </a:fld>
             <a:endParaRPr lang="en-US"/>
           </a:p>
@@ -593,7 +593,7 @@
           <a:p>
             <a:fld id="{3A6E2EEE-5BD3-164B-A81F-37A9AF828EF7}" type="datetimeFigureOut">
               <a:rPr lang="en-US" smtClean="0"/>
-              <a:t>9/13/20</a:t>
+              <a:t>11/8/20</a:t>
             </a:fld>
             <a:endParaRPr lang="en-US"/>
           </a:p>
@@ -763,7 +763,7 @@
           <a:p>
             <a:fld id="{3A6E2EEE-5BD3-164B-A81F-37A9AF828EF7}" type="datetimeFigureOut">
               <a:rPr lang="en-US" smtClean="0"/>
-              <a:t>9/13/20</a:t>
+              <a:t>11/8/20</a:t>
             </a:fld>
             <a:endParaRPr lang="en-US"/>
           </a:p>
@@ -1007,7 +1007,7 @@
           <a:p>
             <a:fld id="{3A6E2EEE-5BD3-164B-A81F-37A9AF828EF7}" type="datetimeFigureOut">
               <a:rPr lang="en-US" smtClean="0"/>
-              <a:t>9/13/20</a:t>
+              <a:t>11/8/20</a:t>
             </a:fld>
             <a:endParaRPr lang="en-US"/>
           </a:p>
@@ -1239,7 +1239,7 @@
           <a:p>
             <a:fld id="{3A6E2EEE-5BD3-164B-A81F-37A9AF828EF7}" type="datetimeFigureOut">
               <a:rPr lang="en-US" smtClean="0"/>
-              <a:t>9/13/20</a:t>
+              <a:t>11/8/20</a:t>
             </a:fld>
             <a:endParaRPr lang="en-US"/>
           </a:p>
@@ -1606,7 +1606,7 @@
           <a:p>
             <a:fld id="{3A6E2EEE-5BD3-164B-A81F-37A9AF828EF7}" type="datetimeFigureOut">
               <a:rPr lang="en-US" smtClean="0"/>
-              <a:t>9/13/20</a:t>
+              <a:t>11/8/20</a:t>
             </a:fld>
             <a:endParaRPr lang="en-US"/>
           </a:p>
@@ -1724,7 +1724,7 @@
           <a:p>
             <a:fld id="{3A6E2EEE-5BD3-164B-A81F-37A9AF828EF7}" type="datetimeFigureOut">
               <a:rPr lang="en-US" smtClean="0"/>
-              <a:t>9/13/20</a:t>
+              <a:t>11/8/20</a:t>
             </a:fld>
             <a:endParaRPr lang="en-US"/>
           </a:p>
@@ -1819,7 +1819,7 @@
           <a:p>
             <a:fld id="{3A6E2EEE-5BD3-164B-A81F-37A9AF828EF7}" type="datetimeFigureOut">
               <a:rPr lang="en-US" smtClean="0"/>
-              <a:t>9/13/20</a:t>
+              <a:t>11/8/20</a:t>
             </a:fld>
             <a:endParaRPr lang="en-US"/>
           </a:p>
@@ -2096,7 +2096,7 @@
           <a:p>
             <a:fld id="{3A6E2EEE-5BD3-164B-A81F-37A9AF828EF7}" type="datetimeFigureOut">
               <a:rPr lang="en-US" smtClean="0"/>
-              <a:t>9/13/20</a:t>
+              <a:t>11/8/20</a:t>
             </a:fld>
             <a:endParaRPr lang="en-US"/>
           </a:p>
@@ -2353,7 +2353,7 @@
           <a:p>
             <a:fld id="{3A6E2EEE-5BD3-164B-A81F-37A9AF828EF7}" type="datetimeFigureOut">
               <a:rPr lang="en-US" smtClean="0"/>
-              <a:t>9/13/20</a:t>
+              <a:t>11/8/20</a:t>
             </a:fld>
             <a:endParaRPr lang="en-US"/>
           </a:p>
@@ -2566,7 +2566,7 @@
           <a:p>
             <a:fld id="{3A6E2EEE-5BD3-164B-A81F-37A9AF828EF7}" type="datetimeFigureOut">
               <a:rPr lang="en-US" smtClean="0"/>
-              <a:t>9/13/20</a:t>
+              <a:t>11/8/20</a:t>
             </a:fld>
             <a:endParaRPr lang="en-US"/>
           </a:p>
@@ -3230,11 +3230,11 @@
               <a:t>Hiroaki Ogasawara(@</a:t>
             </a:r>
             <a:r>
-              <a:rPr lang="en-US" altLang="ja-JP" sz="1600" dirty="0" err="1">
+              <a:rPr lang="en-US" altLang="ja-JP" sz="1600">
                 <a:latin typeface="Meiryo UI" panose="020B0604030504040204" pitchFamily="34" charset="-128"/>
                 <a:ea typeface="Meiryo UI" panose="020B0604030504040204" pitchFamily="34" charset="-128"/>
               </a:rPr>
-              <a:t>hiroga_cc</a:t>
+              <a:t>xhiroga</a:t>
             </a:r>
             <a:r>
               <a:rPr lang="ja-JP" altLang="en-US" sz="1600">

</xml_diff>